<commit_message>
Lektion 1 fast abgeschlossen
</commit_message>
<xml_diff>
--- a/content/files/pp/JAdventure.pptx
+++ b/content/files/pp/JAdventure.pptx
@@ -5,11 +5,17 @@
     <p:sldMasterId id="2147483648" r:id="rId1"/>
   </p:sldMasterIdLst>
   <p:notesMasterIdLst>
-    <p:notesMasterId r:id="rId4"/>
+    <p:notesMasterId r:id="rId10"/>
   </p:notesMasterIdLst>
   <p:sldIdLst>
     <p:sldId id="256" r:id="rId2"/>
-    <p:sldId id="257" r:id="rId3"/>
+    <p:sldId id="258" r:id="rId3"/>
+    <p:sldId id="259" r:id="rId4"/>
+    <p:sldId id="260" r:id="rId5"/>
+    <p:sldId id="261" r:id="rId6"/>
+    <p:sldId id="262" r:id="rId7"/>
+    <p:sldId id="263" r:id="rId8"/>
+    <p:sldId id="257" r:id="rId9"/>
   </p:sldIdLst>
   <p:sldSz cx="12192000" cy="6858000"/>
   <p:notesSz cx="6858000" cy="9144000"/>
@@ -201,7 +207,7 @@
           <a:p>
             <a:fld id="{EE6CFBD2-79AB-1C4D-93E1-B31A0534F9F7}" type="datetimeFigureOut">
               <a:rPr lang="de-DE" smtClean="0"/>
-              <a:t>11.01.23</a:t>
+              <a:t>26.01.23</a:t>
             </a:fld>
             <a:endParaRPr lang="de-DE"/>
           </a:p>
@@ -699,7 +705,7 @@
           <a:p>
             <a:fld id="{697DBD05-FDB4-8941-AA24-2DD7A82C953D}" type="datetimeFigureOut">
               <a:rPr lang="de-DE" smtClean="0"/>
-              <a:t>11.01.23</a:t>
+              <a:t>26.01.23</a:t>
             </a:fld>
             <a:endParaRPr lang="de-DE"/>
           </a:p>
@@ -897,7 +903,7 @@
           <a:p>
             <a:fld id="{697DBD05-FDB4-8941-AA24-2DD7A82C953D}" type="datetimeFigureOut">
               <a:rPr lang="de-DE" smtClean="0"/>
-              <a:t>11.01.23</a:t>
+              <a:t>26.01.23</a:t>
             </a:fld>
             <a:endParaRPr lang="de-DE"/>
           </a:p>
@@ -1105,7 +1111,7 @@
           <a:p>
             <a:fld id="{697DBD05-FDB4-8941-AA24-2DD7A82C953D}" type="datetimeFigureOut">
               <a:rPr lang="de-DE" smtClean="0"/>
-              <a:t>11.01.23</a:t>
+              <a:t>26.01.23</a:t>
             </a:fld>
             <a:endParaRPr lang="de-DE"/>
           </a:p>
@@ -1303,7 +1309,7 @@
           <a:p>
             <a:fld id="{697DBD05-FDB4-8941-AA24-2DD7A82C953D}" type="datetimeFigureOut">
               <a:rPr lang="de-DE" smtClean="0"/>
-              <a:t>11.01.23</a:t>
+              <a:t>26.01.23</a:t>
             </a:fld>
             <a:endParaRPr lang="de-DE"/>
           </a:p>
@@ -1578,7 +1584,7 @@
           <a:p>
             <a:fld id="{697DBD05-FDB4-8941-AA24-2DD7A82C953D}" type="datetimeFigureOut">
               <a:rPr lang="de-DE" smtClean="0"/>
-              <a:t>11.01.23</a:t>
+              <a:t>26.01.23</a:t>
             </a:fld>
             <a:endParaRPr lang="de-DE"/>
           </a:p>
@@ -1843,7 +1849,7 @@
           <a:p>
             <a:fld id="{697DBD05-FDB4-8941-AA24-2DD7A82C953D}" type="datetimeFigureOut">
               <a:rPr lang="de-DE" smtClean="0"/>
-              <a:t>11.01.23</a:t>
+              <a:t>26.01.23</a:t>
             </a:fld>
             <a:endParaRPr lang="de-DE"/>
           </a:p>
@@ -2255,7 +2261,7 @@
           <a:p>
             <a:fld id="{697DBD05-FDB4-8941-AA24-2DD7A82C953D}" type="datetimeFigureOut">
               <a:rPr lang="de-DE" smtClean="0"/>
-              <a:t>11.01.23</a:t>
+              <a:t>26.01.23</a:t>
             </a:fld>
             <a:endParaRPr lang="de-DE"/>
           </a:p>
@@ -2396,7 +2402,7 @@
           <a:p>
             <a:fld id="{697DBD05-FDB4-8941-AA24-2DD7A82C953D}" type="datetimeFigureOut">
               <a:rPr lang="de-DE" smtClean="0"/>
-              <a:t>11.01.23</a:t>
+              <a:t>26.01.23</a:t>
             </a:fld>
             <a:endParaRPr lang="de-DE"/>
           </a:p>
@@ -2509,7 +2515,7 @@
           <a:p>
             <a:fld id="{697DBD05-FDB4-8941-AA24-2DD7A82C953D}" type="datetimeFigureOut">
               <a:rPr lang="de-DE" smtClean="0"/>
-              <a:t>11.01.23</a:t>
+              <a:t>26.01.23</a:t>
             </a:fld>
             <a:endParaRPr lang="de-DE"/>
           </a:p>
@@ -2820,7 +2826,7 @@
           <a:p>
             <a:fld id="{697DBD05-FDB4-8941-AA24-2DD7A82C953D}" type="datetimeFigureOut">
               <a:rPr lang="de-DE" smtClean="0"/>
-              <a:t>11.01.23</a:t>
+              <a:t>26.01.23</a:t>
             </a:fld>
             <a:endParaRPr lang="de-DE"/>
           </a:p>
@@ -3108,7 +3114,7 @@
           <a:p>
             <a:fld id="{697DBD05-FDB4-8941-AA24-2DD7A82C953D}" type="datetimeFigureOut">
               <a:rPr lang="de-DE" smtClean="0"/>
-              <a:t>11.01.23</a:t>
+              <a:t>26.01.23</a:t>
             </a:fld>
             <a:endParaRPr lang="de-DE"/>
           </a:p>
@@ -3349,7 +3355,7 @@
           <a:p>
             <a:fld id="{697DBD05-FDB4-8941-AA24-2DD7A82C953D}" type="datetimeFigureOut">
               <a:rPr lang="de-DE" smtClean="0"/>
-              <a:t>11.01.23</a:t>
+              <a:t>26.01.23</a:t>
             </a:fld>
             <a:endParaRPr lang="de-DE"/>
           </a:p>
@@ -3928,7 +3934,7 @@
             <a:pPr algn="l"/>
             <a:r>
               <a:rPr lang="de-DE" dirty="0"/>
-              <a:t>Der Java Kurs</a:t>
+              <a:t>Ein Kurs zur Softwareentwicklung</a:t>
             </a:r>
           </a:p>
         </p:txBody>
@@ -4796,6 +4802,66 @@
           </a:p>
         </p:txBody>
       </p:sp>
+      <p:pic>
+        <p:nvPicPr>
+          <p:cNvPr id="7" name="Grafik 6">
+            <a:extLst>
+              <a:ext uri="{FF2B5EF4-FFF2-40B4-BE49-F238E27FC236}">
+                <a16:creationId xmlns:a16="http://schemas.microsoft.com/office/drawing/2014/main" id="{A72490D9-7D13-8659-F506-C5901E8B550D}"/>
+              </a:ext>
+            </a:extLst>
+          </p:cNvPr>
+          <p:cNvPicPr>
+            <a:picLocks noChangeAspect="1"/>
+          </p:cNvPicPr>
+          <p:nvPr/>
+        </p:nvPicPr>
+        <p:blipFill>
+          <a:blip r:embed="rId4"/>
+          <a:stretch>
+            <a:fillRect/>
+          </a:stretch>
+        </p:blipFill>
+        <p:spPr>
+          <a:xfrm>
+            <a:off x="147755" y="147470"/>
+            <a:ext cx="1464069" cy="1464069"/>
+          </a:xfrm>
+          <a:prstGeom prst="rect">
+            <a:avLst/>
+          </a:prstGeom>
+        </p:spPr>
+      </p:pic>
+      <p:pic>
+        <p:nvPicPr>
+          <p:cNvPr id="10" name="Grafik 9">
+            <a:extLst>
+              <a:ext uri="{FF2B5EF4-FFF2-40B4-BE49-F238E27FC236}">
+                <a16:creationId xmlns:a16="http://schemas.microsoft.com/office/drawing/2014/main" id="{C0D595F7-94BC-68EB-9DEB-426B92FC2298}"/>
+              </a:ext>
+            </a:extLst>
+          </p:cNvPr>
+          <p:cNvPicPr>
+            <a:picLocks noChangeAspect="1"/>
+          </p:cNvPicPr>
+          <p:nvPr/>
+        </p:nvPicPr>
+        <p:blipFill>
+          <a:blip r:embed="rId5"/>
+          <a:stretch>
+            <a:fillRect/>
+          </a:stretch>
+        </p:blipFill>
+        <p:spPr>
+          <a:xfrm>
+            <a:off x="10254827" y="147470"/>
+            <a:ext cx="1789418" cy="1464069"/>
+          </a:xfrm>
+          <a:prstGeom prst="rect">
+            <a:avLst/>
+          </a:prstGeom>
+        </p:spPr>
+      </p:pic>
     </p:spTree>
     <p:extLst>
       <p:ext uri="{BB962C8B-B14F-4D97-AF65-F5344CB8AC3E}">
@@ -4810,6 +4876,747 @@
 </file>
 
 <file path=ppt/slides/slide2.xml><?xml version="1.0" encoding="utf-8"?>
+<p:sld xmlns:a="http://schemas.openxmlformats.org/drawingml/2006/main" xmlns:r="http://schemas.openxmlformats.org/officeDocument/2006/relationships" xmlns:p="http://schemas.openxmlformats.org/presentationml/2006/main">
+  <p:cSld>
+    <p:spTree>
+      <p:nvGrpSpPr>
+        <p:cNvPr id="1" name=""/>
+        <p:cNvGrpSpPr/>
+        <p:nvPr/>
+      </p:nvGrpSpPr>
+      <p:grpSpPr>
+        <a:xfrm>
+          <a:off x="0" y="0"/>
+          <a:ext cx="0" cy="0"/>
+          <a:chOff x="0" y="0"/>
+          <a:chExt cx="0" cy="0"/>
+        </a:xfrm>
+      </p:grpSpPr>
+      <p:sp>
+        <p:nvSpPr>
+          <p:cNvPr id="2" name="Titel 1">
+            <a:extLst>
+              <a:ext uri="{FF2B5EF4-FFF2-40B4-BE49-F238E27FC236}">
+                <a16:creationId xmlns:a16="http://schemas.microsoft.com/office/drawing/2014/main" id="{7E70F8A2-1799-DE60-C2C6-E9FF2C73355C}"/>
+              </a:ext>
+            </a:extLst>
+          </p:cNvPr>
+          <p:cNvSpPr>
+            <a:spLocks noGrp="1"/>
+          </p:cNvSpPr>
+          <p:nvPr>
+            <p:ph type="title"/>
+          </p:nvPr>
+        </p:nvSpPr>
+        <p:spPr/>
+        <p:txBody>
+          <a:bodyPr/>
+          <a:lstStyle/>
+          <a:p>
+            <a:r>
+              <a:rPr lang="de-DE" dirty="0"/>
+              <a:t>Inhalte des Kurses</a:t>
+            </a:r>
+          </a:p>
+        </p:txBody>
+      </p:sp>
+      <p:sp>
+        <p:nvSpPr>
+          <p:cNvPr id="3" name="Inhaltsplatzhalter 2">
+            <a:extLst>
+              <a:ext uri="{FF2B5EF4-FFF2-40B4-BE49-F238E27FC236}">
+                <a16:creationId xmlns:a16="http://schemas.microsoft.com/office/drawing/2014/main" id="{C1F47FCB-5ECB-8B07-7B42-C5B4C4915F96}"/>
+              </a:ext>
+            </a:extLst>
+          </p:cNvPr>
+          <p:cNvSpPr>
+            <a:spLocks noGrp="1"/>
+          </p:cNvSpPr>
+          <p:nvPr>
+            <p:ph idx="1"/>
+          </p:nvPr>
+        </p:nvSpPr>
+        <p:spPr/>
+        <p:txBody>
+          <a:bodyPr/>
+          <a:lstStyle/>
+          <a:p>
+            <a:r>
+              <a:rPr lang="de-DE" dirty="0"/>
+              <a:t>Agile Arbeitsweise</a:t>
+            </a:r>
+          </a:p>
+          <a:p>
+            <a:r>
+              <a:rPr lang="de-DE" dirty="0"/>
+              <a:t>Diverse Tools (</a:t>
+            </a:r>
+            <a:r>
+              <a:rPr lang="de-DE" dirty="0" err="1"/>
+              <a:t>git</a:t>
+            </a:r>
+            <a:r>
+              <a:rPr lang="de-DE" dirty="0"/>
+              <a:t>, Maven, PMD, </a:t>
+            </a:r>
+            <a:r>
+              <a:rPr lang="de-DE" dirty="0" err="1"/>
+              <a:t>Spotbugs</a:t>
+            </a:r>
+            <a:r>
+              <a:rPr lang="de-DE" dirty="0"/>
+              <a:t>, …)</a:t>
+            </a:r>
+          </a:p>
+          <a:p>
+            <a:r>
+              <a:rPr lang="de-DE" dirty="0"/>
+              <a:t>Clean Code</a:t>
+            </a:r>
+          </a:p>
+          <a:p>
+            <a:r>
+              <a:rPr lang="de-DE" dirty="0"/>
+              <a:t>Entwurfsmuster</a:t>
+            </a:r>
+          </a:p>
+          <a:p>
+            <a:r>
+              <a:rPr lang="de-DE" dirty="0"/>
+              <a:t>Frameworks (</a:t>
+            </a:r>
+            <a:r>
+              <a:rPr lang="de-DE" dirty="0" err="1"/>
+              <a:t>gson</a:t>
+            </a:r>
+            <a:r>
+              <a:rPr lang="de-DE" dirty="0"/>
+              <a:t>, Hibernate, …)</a:t>
+            </a:r>
+          </a:p>
+          <a:p>
+            <a:pPr marL="0" indent="0">
+              <a:buNone/>
+            </a:pPr>
+            <a:endParaRPr lang="de-DE" dirty="0"/>
+          </a:p>
+        </p:txBody>
+      </p:sp>
+    </p:spTree>
+    <p:extLst>
+      <p:ext uri="{BB962C8B-B14F-4D97-AF65-F5344CB8AC3E}">
+        <p14:creationId xmlns:p14="http://schemas.microsoft.com/office/powerpoint/2010/main" val="1178443818"/>
+      </p:ext>
+    </p:extLst>
+  </p:cSld>
+  <p:clrMapOvr>
+    <a:masterClrMapping/>
+  </p:clrMapOvr>
+</p:sld>
+</file>
+
+<file path=ppt/slides/slide3.xml><?xml version="1.0" encoding="utf-8"?>
+<p:sld xmlns:a="http://schemas.openxmlformats.org/drawingml/2006/main" xmlns:r="http://schemas.openxmlformats.org/officeDocument/2006/relationships" xmlns:p="http://schemas.openxmlformats.org/presentationml/2006/main">
+  <p:cSld>
+    <p:spTree>
+      <p:nvGrpSpPr>
+        <p:cNvPr id="1" name=""/>
+        <p:cNvGrpSpPr/>
+        <p:nvPr/>
+      </p:nvGrpSpPr>
+      <p:grpSpPr>
+        <a:xfrm>
+          <a:off x="0" y="0"/>
+          <a:ext cx="0" cy="0"/>
+          <a:chOff x="0" y="0"/>
+          <a:chExt cx="0" cy="0"/>
+        </a:xfrm>
+      </p:grpSpPr>
+      <p:sp>
+        <p:nvSpPr>
+          <p:cNvPr id="2" name="Titel 1">
+            <a:extLst>
+              <a:ext uri="{FF2B5EF4-FFF2-40B4-BE49-F238E27FC236}">
+                <a16:creationId xmlns:a16="http://schemas.microsoft.com/office/drawing/2014/main" id="{471BED72-2C6E-26A9-EB5C-E51415F15688}"/>
+              </a:ext>
+            </a:extLst>
+          </p:cNvPr>
+          <p:cNvSpPr>
+            <a:spLocks noGrp="1"/>
+          </p:cNvSpPr>
+          <p:nvPr>
+            <p:ph type="title"/>
+          </p:nvPr>
+        </p:nvSpPr>
+        <p:spPr/>
+        <p:txBody>
+          <a:bodyPr/>
+          <a:lstStyle/>
+          <a:p>
+            <a:r>
+              <a:rPr lang="de-DE" dirty="0"/>
+              <a:t>Nicht Bestandteil des Kurses </a:t>
+            </a:r>
+          </a:p>
+        </p:txBody>
+      </p:sp>
+      <p:sp>
+        <p:nvSpPr>
+          <p:cNvPr id="3" name="Inhaltsplatzhalter 2">
+            <a:extLst>
+              <a:ext uri="{FF2B5EF4-FFF2-40B4-BE49-F238E27FC236}">
+                <a16:creationId xmlns:a16="http://schemas.microsoft.com/office/drawing/2014/main" id="{916AFF8D-4330-9BCE-9A0C-E310CD9724B5}"/>
+              </a:ext>
+            </a:extLst>
+          </p:cNvPr>
+          <p:cNvSpPr>
+            <a:spLocks noGrp="1"/>
+          </p:cNvSpPr>
+          <p:nvPr>
+            <p:ph idx="1"/>
+          </p:nvPr>
+        </p:nvSpPr>
+        <p:spPr/>
+        <p:txBody>
+          <a:bodyPr>
+            <a:normAutofit/>
+          </a:bodyPr>
+          <a:lstStyle/>
+          <a:p>
+            <a:pPr algn="ctr"/>
+            <a:endParaRPr lang="de-DE" sz="6000" dirty="0">
+              <a:solidFill>
+                <a:srgbClr val="FF0000"/>
+              </a:solidFill>
+            </a:endParaRPr>
+          </a:p>
+          <a:p>
+            <a:pPr marL="0" indent="0" algn="ctr">
+              <a:buNone/>
+            </a:pPr>
+            <a:r>
+              <a:rPr lang="de-DE" sz="6000" dirty="0">
+                <a:solidFill>
+                  <a:srgbClr val="FF0000"/>
+                </a:solidFill>
+              </a:rPr>
+              <a:t>Dies ist keine Einführung</a:t>
+            </a:r>
+          </a:p>
+          <a:p>
+            <a:pPr marL="0" indent="0" algn="ctr">
+              <a:buNone/>
+            </a:pPr>
+            <a:r>
+              <a:rPr lang="de-DE" sz="6000" dirty="0">
+                <a:solidFill>
+                  <a:srgbClr val="FF0000"/>
+                </a:solidFill>
+              </a:rPr>
+              <a:t>in Java!</a:t>
+            </a:r>
+          </a:p>
+        </p:txBody>
+      </p:sp>
+    </p:spTree>
+    <p:extLst>
+      <p:ext uri="{BB962C8B-B14F-4D97-AF65-F5344CB8AC3E}">
+        <p14:creationId xmlns:p14="http://schemas.microsoft.com/office/powerpoint/2010/main" val="2981256955"/>
+      </p:ext>
+    </p:extLst>
+  </p:cSld>
+  <p:clrMapOvr>
+    <a:masterClrMapping/>
+  </p:clrMapOvr>
+</p:sld>
+</file>
+
+<file path=ppt/slides/slide4.xml><?xml version="1.0" encoding="utf-8"?>
+<p:sld xmlns:a="http://schemas.openxmlformats.org/drawingml/2006/main" xmlns:r="http://schemas.openxmlformats.org/officeDocument/2006/relationships" xmlns:p="http://schemas.openxmlformats.org/presentationml/2006/main">
+  <p:cSld>
+    <p:spTree>
+      <p:nvGrpSpPr>
+        <p:cNvPr id="1" name=""/>
+        <p:cNvGrpSpPr/>
+        <p:nvPr/>
+      </p:nvGrpSpPr>
+      <p:grpSpPr>
+        <a:xfrm>
+          <a:off x="0" y="0"/>
+          <a:ext cx="0" cy="0"/>
+          <a:chOff x="0" y="0"/>
+          <a:chExt cx="0" cy="0"/>
+        </a:xfrm>
+      </p:grpSpPr>
+      <p:sp>
+        <p:nvSpPr>
+          <p:cNvPr id="2" name="Titel 1">
+            <a:extLst>
+              <a:ext uri="{FF2B5EF4-FFF2-40B4-BE49-F238E27FC236}">
+                <a16:creationId xmlns:a16="http://schemas.microsoft.com/office/drawing/2014/main" id="{C51F2EC3-6B61-80D3-5627-CA71FFCE93FA}"/>
+              </a:ext>
+            </a:extLst>
+          </p:cNvPr>
+          <p:cNvSpPr>
+            <a:spLocks noGrp="1"/>
+          </p:cNvSpPr>
+          <p:nvPr>
+            <p:ph type="title"/>
+          </p:nvPr>
+        </p:nvSpPr>
+        <p:spPr/>
+        <p:txBody>
+          <a:bodyPr/>
+          <a:lstStyle/>
+          <a:p>
+            <a:r>
+              <a:rPr lang="de-DE" dirty="0"/>
+              <a:t>Projektidee</a:t>
+            </a:r>
+          </a:p>
+        </p:txBody>
+      </p:sp>
+      <p:sp>
+        <p:nvSpPr>
+          <p:cNvPr id="3" name="Inhaltsplatzhalter 2">
+            <a:extLst>
+              <a:ext uri="{FF2B5EF4-FFF2-40B4-BE49-F238E27FC236}">
+                <a16:creationId xmlns:a16="http://schemas.microsoft.com/office/drawing/2014/main" id="{BC27183B-AA6B-1B9C-B764-0C49B42788AE}"/>
+              </a:ext>
+            </a:extLst>
+          </p:cNvPr>
+          <p:cNvSpPr>
+            <a:spLocks noGrp="1"/>
+          </p:cNvSpPr>
+          <p:nvPr>
+            <p:ph idx="1"/>
+          </p:nvPr>
+        </p:nvSpPr>
+        <p:spPr/>
+        <p:txBody>
+          <a:bodyPr/>
+          <a:lstStyle/>
+          <a:p>
+            <a:r>
+              <a:rPr lang="de-DE" dirty="0"/>
+              <a:t>2D Adventure</a:t>
+            </a:r>
+          </a:p>
+          <a:p>
+            <a:r>
+              <a:rPr lang="de-DE" dirty="0"/>
+              <a:t>Von Lektion zu Lektion weiterer Ausbau</a:t>
+            </a:r>
+          </a:p>
+          <a:p>
+            <a:r>
+              <a:rPr lang="de-DE" dirty="0"/>
+              <a:t>Multiplayer</a:t>
+            </a:r>
+          </a:p>
+        </p:txBody>
+      </p:sp>
+    </p:spTree>
+    <p:extLst>
+      <p:ext uri="{BB962C8B-B14F-4D97-AF65-F5344CB8AC3E}">
+        <p14:creationId xmlns:p14="http://schemas.microsoft.com/office/powerpoint/2010/main" val="237108916"/>
+      </p:ext>
+    </p:extLst>
+  </p:cSld>
+  <p:clrMapOvr>
+    <a:masterClrMapping/>
+  </p:clrMapOvr>
+</p:sld>
+</file>
+
+<file path=ppt/slides/slide5.xml><?xml version="1.0" encoding="utf-8"?>
+<p:sld xmlns:a="http://schemas.openxmlformats.org/drawingml/2006/main" xmlns:r="http://schemas.openxmlformats.org/officeDocument/2006/relationships" xmlns:p="http://schemas.openxmlformats.org/presentationml/2006/main">
+  <p:cSld>
+    <p:spTree>
+      <p:nvGrpSpPr>
+        <p:cNvPr id="1" name=""/>
+        <p:cNvGrpSpPr/>
+        <p:nvPr/>
+      </p:nvGrpSpPr>
+      <p:grpSpPr>
+        <a:xfrm>
+          <a:off x="0" y="0"/>
+          <a:ext cx="0" cy="0"/>
+          <a:chOff x="0" y="0"/>
+          <a:chExt cx="0" cy="0"/>
+        </a:xfrm>
+      </p:grpSpPr>
+      <p:sp>
+        <p:nvSpPr>
+          <p:cNvPr id="2" name="Titel 1">
+            <a:extLst>
+              <a:ext uri="{FF2B5EF4-FFF2-40B4-BE49-F238E27FC236}">
+                <a16:creationId xmlns:a16="http://schemas.microsoft.com/office/drawing/2014/main" id="{B3046B39-D907-C5F1-C9D0-B49037F45391}"/>
+              </a:ext>
+            </a:extLst>
+          </p:cNvPr>
+          <p:cNvSpPr>
+            <a:spLocks noGrp="1"/>
+          </p:cNvSpPr>
+          <p:nvPr>
+            <p:ph type="title"/>
+          </p:nvPr>
+        </p:nvSpPr>
+        <p:spPr/>
+        <p:txBody>
+          <a:bodyPr/>
+          <a:lstStyle/>
+          <a:p>
+            <a:r>
+              <a:rPr lang="de-DE" dirty="0"/>
+              <a:t>Komponenten</a:t>
+            </a:r>
+          </a:p>
+        </p:txBody>
+      </p:sp>
+      <p:sp>
+        <p:nvSpPr>
+          <p:cNvPr id="3" name="Inhaltsplatzhalter 2">
+            <a:extLst>
+              <a:ext uri="{FF2B5EF4-FFF2-40B4-BE49-F238E27FC236}">
+                <a16:creationId xmlns:a16="http://schemas.microsoft.com/office/drawing/2014/main" id="{5DBA9C76-DF89-419D-D16C-18382A741804}"/>
+              </a:ext>
+            </a:extLst>
+          </p:cNvPr>
+          <p:cNvSpPr>
+            <a:spLocks noGrp="1"/>
+          </p:cNvSpPr>
+          <p:nvPr>
+            <p:ph idx="1"/>
+          </p:nvPr>
+        </p:nvSpPr>
+        <p:spPr/>
+        <p:txBody>
+          <a:bodyPr/>
+          <a:lstStyle/>
+          <a:p>
+            <a:r>
+              <a:rPr lang="de-DE" dirty="0"/>
+              <a:t>Webseite </a:t>
+            </a:r>
+            <a:r>
+              <a:rPr lang="de-DE" dirty="0">
+                <a:hlinkClick r:id="rId2"/>
+              </a:rPr>
+              <a:t>https://www.jadventure.de</a:t>
+            </a:r>
+            <a:r>
+              <a:rPr lang="de-DE" dirty="0"/>
+              <a:t> mit Erläuterungen</a:t>
+            </a:r>
+          </a:p>
+          <a:p>
+            <a:r>
+              <a:rPr lang="de-DE" dirty="0"/>
+              <a:t>Pro Lektion Videos mit Erklärungen zu den einzelnen Punkten</a:t>
+            </a:r>
+          </a:p>
+          <a:p>
+            <a:r>
+              <a:rPr lang="de-DE" dirty="0"/>
+              <a:t>PowerPoint Präsentation (aus den Videos)</a:t>
+            </a:r>
+          </a:p>
+          <a:p>
+            <a:r>
+              <a:rPr lang="de-DE" dirty="0"/>
+              <a:t>GitHub Repository mit Source Code (Für jede Lektion gibt es einen eigenen Branch)</a:t>
+            </a:r>
+          </a:p>
+          <a:p>
+            <a:endParaRPr lang="de-DE" dirty="0"/>
+          </a:p>
+        </p:txBody>
+      </p:sp>
+    </p:spTree>
+    <p:extLst>
+      <p:ext uri="{BB962C8B-B14F-4D97-AF65-F5344CB8AC3E}">
+        <p14:creationId xmlns:p14="http://schemas.microsoft.com/office/powerpoint/2010/main" val="703334329"/>
+      </p:ext>
+    </p:extLst>
+  </p:cSld>
+  <p:clrMapOvr>
+    <a:masterClrMapping/>
+  </p:clrMapOvr>
+</p:sld>
+</file>
+
+<file path=ppt/slides/slide6.xml><?xml version="1.0" encoding="utf-8"?>
+<p:sld xmlns:a="http://schemas.openxmlformats.org/drawingml/2006/main" xmlns:r="http://schemas.openxmlformats.org/officeDocument/2006/relationships" xmlns:p="http://schemas.openxmlformats.org/presentationml/2006/main">
+  <p:cSld>
+    <p:spTree>
+      <p:nvGrpSpPr>
+        <p:cNvPr id="1" name=""/>
+        <p:cNvGrpSpPr/>
+        <p:nvPr/>
+      </p:nvGrpSpPr>
+      <p:grpSpPr>
+        <a:xfrm>
+          <a:off x="0" y="0"/>
+          <a:ext cx="0" cy="0"/>
+          <a:chOff x="0" y="0"/>
+          <a:chExt cx="0" cy="0"/>
+        </a:xfrm>
+      </p:grpSpPr>
+      <p:sp>
+        <p:nvSpPr>
+          <p:cNvPr id="2" name="Titel 1">
+            <a:extLst>
+              <a:ext uri="{FF2B5EF4-FFF2-40B4-BE49-F238E27FC236}">
+                <a16:creationId xmlns:a16="http://schemas.microsoft.com/office/drawing/2014/main" id="{BF527F38-EA0A-B9A9-2F6B-10431800513D}"/>
+              </a:ext>
+            </a:extLst>
+          </p:cNvPr>
+          <p:cNvSpPr>
+            <a:spLocks noGrp="1"/>
+          </p:cNvSpPr>
+          <p:nvPr>
+            <p:ph type="title"/>
+          </p:nvPr>
+        </p:nvSpPr>
+        <p:spPr/>
+        <p:txBody>
+          <a:bodyPr/>
+          <a:lstStyle/>
+          <a:p>
+            <a:r>
+              <a:rPr lang="de-DE" dirty="0"/>
+              <a:t>Lizenz</a:t>
+            </a:r>
+          </a:p>
+        </p:txBody>
+      </p:sp>
+      <p:sp>
+        <p:nvSpPr>
+          <p:cNvPr id="3" name="Inhaltsplatzhalter 2">
+            <a:extLst>
+              <a:ext uri="{FF2B5EF4-FFF2-40B4-BE49-F238E27FC236}">
+                <a16:creationId xmlns:a16="http://schemas.microsoft.com/office/drawing/2014/main" id="{C8AF4F96-58C0-607C-0D86-23DE1AE7F6F2}"/>
+              </a:ext>
+            </a:extLst>
+          </p:cNvPr>
+          <p:cNvSpPr>
+            <a:spLocks noGrp="1"/>
+          </p:cNvSpPr>
+          <p:nvPr>
+            <p:ph idx="1"/>
+          </p:nvPr>
+        </p:nvSpPr>
+        <p:spPr/>
+        <p:txBody>
+          <a:bodyPr/>
+          <a:lstStyle/>
+          <a:p>
+            <a:pPr marL="0" indent="0">
+              <a:buNone/>
+            </a:pPr>
+            <a:r>
+              <a:rPr lang="de-DE" dirty="0"/>
+              <a:t>Attribution-</a:t>
+            </a:r>
+            <a:r>
+              <a:rPr lang="de-DE" dirty="0" err="1"/>
+              <a:t>ShareAlike</a:t>
+            </a:r>
+            <a:r>
+              <a:rPr lang="de-DE" dirty="0"/>
+              <a:t> 4.0 (CC BY-SA 4.0)</a:t>
+            </a:r>
+          </a:p>
+          <a:p>
+            <a:pPr marL="0" indent="0">
+              <a:buNone/>
+            </a:pPr>
+            <a:endParaRPr lang="de-DE" dirty="0"/>
+          </a:p>
+          <a:p>
+            <a:pPr>
+              <a:buFontTx/>
+              <a:buChar char="-"/>
+            </a:pPr>
+            <a:r>
+              <a:rPr lang="de-DE" dirty="0"/>
+              <a:t>Angemessene Nennung</a:t>
+            </a:r>
+          </a:p>
+          <a:p>
+            <a:pPr>
+              <a:buFontTx/>
+              <a:buChar char="-"/>
+            </a:pPr>
+            <a:r>
+              <a:rPr lang="de-DE" dirty="0"/>
+              <a:t>Wenn man Teile oder das Ganze für sich verwendet, dann muss das Erstellte auch unter dieser Lizenz stehen.</a:t>
+            </a:r>
+          </a:p>
+        </p:txBody>
+      </p:sp>
+    </p:spTree>
+    <p:extLst>
+      <p:ext uri="{BB962C8B-B14F-4D97-AF65-F5344CB8AC3E}">
+        <p14:creationId xmlns:p14="http://schemas.microsoft.com/office/powerpoint/2010/main" val="3242861878"/>
+      </p:ext>
+    </p:extLst>
+  </p:cSld>
+  <p:clrMapOvr>
+    <a:masterClrMapping/>
+  </p:clrMapOvr>
+</p:sld>
+</file>
+
+<file path=ppt/slides/slide7.xml><?xml version="1.0" encoding="utf-8"?>
+<p:sld xmlns:a="http://schemas.openxmlformats.org/drawingml/2006/main" xmlns:r="http://schemas.openxmlformats.org/officeDocument/2006/relationships" xmlns:p="http://schemas.openxmlformats.org/presentationml/2006/main">
+  <p:cSld>
+    <p:spTree>
+      <p:nvGrpSpPr>
+        <p:cNvPr id="1" name=""/>
+        <p:cNvGrpSpPr/>
+        <p:nvPr/>
+      </p:nvGrpSpPr>
+      <p:grpSpPr>
+        <a:xfrm>
+          <a:off x="0" y="0"/>
+          <a:ext cx="0" cy="0"/>
+          <a:chOff x="0" y="0"/>
+          <a:chExt cx="0" cy="0"/>
+        </a:xfrm>
+      </p:grpSpPr>
+      <p:sp>
+        <p:nvSpPr>
+          <p:cNvPr id="2" name="Titel 1">
+            <a:extLst>
+              <a:ext uri="{FF2B5EF4-FFF2-40B4-BE49-F238E27FC236}">
+                <a16:creationId xmlns:a16="http://schemas.microsoft.com/office/drawing/2014/main" id="{3CDDD0DC-C9E4-F9C7-421F-8A6909F71FFB}"/>
+              </a:ext>
+            </a:extLst>
+          </p:cNvPr>
+          <p:cNvSpPr>
+            <a:spLocks noGrp="1"/>
+          </p:cNvSpPr>
+          <p:nvPr>
+            <p:ph type="title"/>
+          </p:nvPr>
+        </p:nvSpPr>
+        <p:spPr/>
+        <p:txBody>
+          <a:bodyPr/>
+          <a:lstStyle/>
+          <a:p>
+            <a:r>
+              <a:rPr lang="de-DE" dirty="0"/>
+              <a:t>Rückmeldungen / Fragen</a:t>
+            </a:r>
+          </a:p>
+        </p:txBody>
+      </p:sp>
+      <p:sp>
+        <p:nvSpPr>
+          <p:cNvPr id="3" name="Inhaltsplatzhalter 2">
+            <a:extLst>
+              <a:ext uri="{FF2B5EF4-FFF2-40B4-BE49-F238E27FC236}">
+                <a16:creationId xmlns:a16="http://schemas.microsoft.com/office/drawing/2014/main" id="{4C86235B-20E2-5ED8-5ACE-3B458D814D7C}"/>
+              </a:ext>
+            </a:extLst>
+          </p:cNvPr>
+          <p:cNvSpPr>
+            <a:spLocks noGrp="1"/>
+          </p:cNvSpPr>
+          <p:nvPr>
+            <p:ph idx="1"/>
+          </p:nvPr>
+        </p:nvSpPr>
+        <p:spPr/>
+        <p:txBody>
+          <a:bodyPr/>
+          <a:lstStyle/>
+          <a:p>
+            <a:pPr marL="0" indent="0">
+              <a:buNone/>
+            </a:pPr>
+            <a:r>
+              <a:rPr lang="de-DE" dirty="0"/>
+              <a:t>Per Email: </a:t>
+            </a:r>
+            <a:r>
+              <a:rPr lang="de-DE" dirty="0">
+                <a:hlinkClick r:id="rId2"/>
+              </a:rPr>
+              <a:t>konrad@kneitzel.de</a:t>
+            </a:r>
+            <a:endParaRPr lang="de-DE" dirty="0"/>
+          </a:p>
+          <a:p>
+            <a:pPr marL="0" indent="0">
+              <a:buNone/>
+            </a:pPr>
+            <a:endParaRPr lang="de-DE" dirty="0"/>
+          </a:p>
+          <a:p>
+            <a:pPr marL="0" indent="0">
+              <a:buNone/>
+            </a:pPr>
+            <a:r>
+              <a:rPr lang="de-DE" dirty="0"/>
+              <a:t>Per Kommentar unter dem Video (YouTube oder </a:t>
+            </a:r>
+            <a:r>
+              <a:rPr lang="de-DE" dirty="0" err="1"/>
+              <a:t>PeerTube</a:t>
+            </a:r>
+            <a:r>
+              <a:rPr lang="de-DE" dirty="0"/>
+              <a:t>)</a:t>
+            </a:r>
+          </a:p>
+          <a:p>
+            <a:pPr marL="0" indent="0">
+              <a:buNone/>
+            </a:pPr>
+            <a:endParaRPr lang="de-DE" dirty="0"/>
+          </a:p>
+          <a:p>
+            <a:pPr marL="0" indent="0">
+              <a:buNone/>
+            </a:pPr>
+            <a:r>
+              <a:rPr lang="de-DE" dirty="0"/>
+              <a:t>Fragen auch gerne im Java Forum: </a:t>
+            </a:r>
+            <a:r>
+              <a:rPr lang="de-DE" dirty="0">
+                <a:hlinkClick r:id="rId3"/>
+              </a:rPr>
+              <a:t>https://www.java-forum.org/</a:t>
+            </a:r>
+            <a:endParaRPr lang="de-DE" dirty="0"/>
+          </a:p>
+          <a:p>
+            <a:pPr marL="0" indent="0">
+              <a:buNone/>
+            </a:pPr>
+            <a:endParaRPr lang="de-DE" dirty="0"/>
+          </a:p>
+        </p:txBody>
+      </p:sp>
+    </p:spTree>
+    <p:extLst>
+      <p:ext uri="{BB962C8B-B14F-4D97-AF65-F5344CB8AC3E}">
+        <p14:creationId xmlns:p14="http://schemas.microsoft.com/office/powerpoint/2010/main" val="1490703218"/>
+      </p:ext>
+    </p:extLst>
+  </p:cSld>
+  <p:clrMapOvr>
+    <a:masterClrMapping/>
+  </p:clrMapOvr>
+</p:sld>
+</file>
+
+<file path=ppt/slides/slide8.xml><?xml version="1.0" encoding="utf-8"?>
 <p:sld xmlns:a="http://schemas.openxmlformats.org/drawingml/2006/main" xmlns:r="http://schemas.openxmlformats.org/officeDocument/2006/relationships" xmlns:p="http://schemas.openxmlformats.org/presentationml/2006/main">
   <p:cSld>
     <p:bg>

</xml_diff>